<commit_message>
compiler and sensor projects added
</commit_message>
<xml_diff>
--- a/Presentación1.pptx
+++ b/Presentación1.pptx
@@ -12,10 +12,11 @@
     <p:sldId id="259" r:id="rId6"/>
     <p:sldId id="265" r:id="rId7"/>
     <p:sldId id="264" r:id="rId8"/>
-    <p:sldId id="261" r:id="rId9"/>
-    <p:sldId id="262" r:id="rId10"/>
-    <p:sldId id="266" r:id="rId11"/>
-    <p:sldId id="263" r:id="rId12"/>
+    <p:sldId id="267" r:id="rId9"/>
+    <p:sldId id="261" r:id="rId10"/>
+    <p:sldId id="262" r:id="rId11"/>
+    <p:sldId id="266" r:id="rId12"/>
+    <p:sldId id="263" r:id="rId13"/>
   </p:sldIdLst>
   <p:sldSz cx="12192000" cy="6858000"/>
   <p:notesSz cx="6858000" cy="9144000"/>
@@ -271,7 +272,7 @@
           <a:p>
             <a:fld id="{25049A47-FF6B-44C7-AF92-DF812083A1D5}" type="datetimeFigureOut">
               <a:rPr lang="es-MX" smtClean="0"/>
-              <a:t>25/07/2019</a:t>
+              <a:t>03/01/2020</a:t>
             </a:fld>
             <a:endParaRPr lang="es-MX"/>
           </a:p>
@@ -471,7 +472,7 @@
           <a:p>
             <a:fld id="{25049A47-FF6B-44C7-AF92-DF812083A1D5}" type="datetimeFigureOut">
               <a:rPr lang="es-MX" smtClean="0"/>
-              <a:t>25/07/2019</a:t>
+              <a:t>03/01/2020</a:t>
             </a:fld>
             <a:endParaRPr lang="es-MX"/>
           </a:p>
@@ -681,7 +682,7 @@
           <a:p>
             <a:fld id="{25049A47-FF6B-44C7-AF92-DF812083A1D5}" type="datetimeFigureOut">
               <a:rPr lang="es-MX" smtClean="0"/>
-              <a:t>25/07/2019</a:t>
+              <a:t>03/01/2020</a:t>
             </a:fld>
             <a:endParaRPr lang="es-MX"/>
           </a:p>
@@ -881,7 +882,7 @@
           <a:p>
             <a:fld id="{25049A47-FF6B-44C7-AF92-DF812083A1D5}" type="datetimeFigureOut">
               <a:rPr lang="es-MX" smtClean="0"/>
-              <a:t>25/07/2019</a:t>
+              <a:t>03/01/2020</a:t>
             </a:fld>
             <a:endParaRPr lang="es-MX"/>
           </a:p>
@@ -1157,7 +1158,7 @@
           <a:p>
             <a:fld id="{25049A47-FF6B-44C7-AF92-DF812083A1D5}" type="datetimeFigureOut">
               <a:rPr lang="es-MX" smtClean="0"/>
-              <a:t>25/07/2019</a:t>
+              <a:t>03/01/2020</a:t>
             </a:fld>
             <a:endParaRPr lang="es-MX"/>
           </a:p>
@@ -1425,7 +1426,7 @@
           <a:p>
             <a:fld id="{25049A47-FF6B-44C7-AF92-DF812083A1D5}" type="datetimeFigureOut">
               <a:rPr lang="es-MX" smtClean="0"/>
-              <a:t>25/07/2019</a:t>
+              <a:t>03/01/2020</a:t>
             </a:fld>
             <a:endParaRPr lang="es-MX"/>
           </a:p>
@@ -1840,7 +1841,7 @@
           <a:p>
             <a:fld id="{25049A47-FF6B-44C7-AF92-DF812083A1D5}" type="datetimeFigureOut">
               <a:rPr lang="es-MX" smtClean="0"/>
-              <a:t>25/07/2019</a:t>
+              <a:t>03/01/2020</a:t>
             </a:fld>
             <a:endParaRPr lang="es-MX"/>
           </a:p>
@@ -1982,7 +1983,7 @@
           <a:p>
             <a:fld id="{25049A47-FF6B-44C7-AF92-DF812083A1D5}" type="datetimeFigureOut">
               <a:rPr lang="es-MX" smtClean="0"/>
-              <a:t>25/07/2019</a:t>
+              <a:t>03/01/2020</a:t>
             </a:fld>
             <a:endParaRPr lang="es-MX"/>
           </a:p>
@@ -2095,7 +2096,7 @@
           <a:p>
             <a:fld id="{25049A47-FF6B-44C7-AF92-DF812083A1D5}" type="datetimeFigureOut">
               <a:rPr lang="es-MX" smtClean="0"/>
-              <a:t>25/07/2019</a:t>
+              <a:t>03/01/2020</a:t>
             </a:fld>
             <a:endParaRPr lang="es-MX"/>
           </a:p>
@@ -2408,7 +2409,7 @@
           <a:p>
             <a:fld id="{25049A47-FF6B-44C7-AF92-DF812083A1D5}" type="datetimeFigureOut">
               <a:rPr lang="es-MX" smtClean="0"/>
-              <a:t>25/07/2019</a:t>
+              <a:t>03/01/2020</a:t>
             </a:fld>
             <a:endParaRPr lang="es-MX"/>
           </a:p>
@@ -2697,7 +2698,7 @@
           <a:p>
             <a:fld id="{25049A47-FF6B-44C7-AF92-DF812083A1D5}" type="datetimeFigureOut">
               <a:rPr lang="es-MX" smtClean="0"/>
-              <a:t>25/07/2019</a:t>
+              <a:t>03/01/2020</a:t>
             </a:fld>
             <a:endParaRPr lang="es-MX"/>
           </a:p>
@@ -2940,7 +2941,7 @@
           <a:p>
             <a:fld id="{25049A47-FF6B-44C7-AF92-DF812083A1D5}" type="datetimeFigureOut">
               <a:rPr lang="es-MX" smtClean="0"/>
-              <a:t>25/07/2019</a:t>
+              <a:t>03/01/2020</a:t>
             </a:fld>
             <a:endParaRPr lang="es-MX"/>
           </a:p>
@@ -3405,6 +3406,181 @@
       </p:grpSpPr>
       <p:pic>
         <p:nvPicPr>
+          <p:cNvPr id="4" name="Imagen 3">
+            <a:extLst>
+              <a:ext uri="{FF2B5EF4-FFF2-40B4-BE49-F238E27FC236}">
+                <a16:creationId xmlns:a16="http://schemas.microsoft.com/office/drawing/2014/main" id="{11698E99-C662-4D51-A6F8-52151F295BBB}"/>
+              </a:ext>
+            </a:extLst>
+          </p:cNvPr>
+          <p:cNvPicPr>
+            <a:picLocks noChangeAspect="1"/>
+          </p:cNvPicPr>
+          <p:nvPr/>
+        </p:nvPicPr>
+        <p:blipFill rotWithShape="1">
+          <a:blip r:embed="rId2">
+            <a:extLst>
+              <a:ext uri="{28A0092B-C50C-407E-A947-70E740481C1C}">
+                <a14:useLocalDpi xmlns:a14="http://schemas.microsoft.com/office/drawing/2010/main" val="0"/>
+              </a:ext>
+            </a:extLst>
+          </a:blip>
+          <a:srcRect r="415"/>
+          <a:stretch/>
+        </p:blipFill>
+        <p:spPr>
+          <a:xfrm>
+            <a:off x="720762" y="381967"/>
+            <a:ext cx="3503143" cy="6236518"/>
+          </a:xfrm>
+          <a:prstGeom prst="rect">
+            <a:avLst/>
+          </a:prstGeom>
+          <a:ln>
+            <a:noFill/>
+          </a:ln>
+          <a:effectLst>
+            <a:outerShdw blurRad="292100" dist="139700" dir="2700000" algn="tl" rotWithShape="0">
+              <a:srgbClr val="333333">
+                <a:alpha val="65000"/>
+              </a:srgbClr>
+            </a:outerShdw>
+          </a:effectLst>
+        </p:spPr>
+      </p:pic>
+      <p:pic>
+        <p:nvPicPr>
+          <p:cNvPr id="6" name="Imagen 5">
+            <a:extLst>
+              <a:ext uri="{FF2B5EF4-FFF2-40B4-BE49-F238E27FC236}">
+                <a16:creationId xmlns:a16="http://schemas.microsoft.com/office/drawing/2014/main" id="{2A25571F-D635-4BCE-AB37-A54D6700B210}"/>
+              </a:ext>
+            </a:extLst>
+          </p:cNvPr>
+          <p:cNvPicPr>
+            <a:picLocks noChangeAspect="1"/>
+          </p:cNvPicPr>
+          <p:nvPr/>
+        </p:nvPicPr>
+        <p:blipFill>
+          <a:blip r:embed="rId3">
+            <a:extLst>
+              <a:ext uri="{28A0092B-C50C-407E-A947-70E740481C1C}">
+                <a14:useLocalDpi xmlns:a14="http://schemas.microsoft.com/office/drawing/2010/main" val="0"/>
+              </a:ext>
+            </a:extLst>
+          </a:blip>
+          <a:stretch>
+            <a:fillRect/>
+          </a:stretch>
+        </p:blipFill>
+        <p:spPr>
+          <a:xfrm>
+            <a:off x="4833259" y="381966"/>
+            <a:ext cx="6850742" cy="3150333"/>
+          </a:xfrm>
+          <a:prstGeom prst="rect">
+            <a:avLst/>
+          </a:prstGeom>
+          <a:ln>
+            <a:noFill/>
+          </a:ln>
+          <a:effectLst>
+            <a:outerShdw blurRad="292100" dist="139700" dir="2700000" algn="tl" rotWithShape="0">
+              <a:srgbClr val="333333">
+                <a:alpha val="65000"/>
+              </a:srgbClr>
+            </a:outerShdw>
+          </a:effectLst>
+        </p:spPr>
+      </p:pic>
+      <p:pic>
+        <p:nvPicPr>
+          <p:cNvPr id="8" name="Imagen 7">
+            <a:extLst>
+              <a:ext uri="{FF2B5EF4-FFF2-40B4-BE49-F238E27FC236}">
+                <a16:creationId xmlns:a16="http://schemas.microsoft.com/office/drawing/2014/main" id="{5E4143A9-94D8-46E5-9D66-1E5A9223217A}"/>
+              </a:ext>
+            </a:extLst>
+          </p:cNvPr>
+          <p:cNvPicPr>
+            <a:picLocks noChangeAspect="1"/>
+          </p:cNvPicPr>
+          <p:nvPr/>
+        </p:nvPicPr>
+        <p:blipFill>
+          <a:blip r:embed="rId4">
+            <a:extLst>
+              <a:ext uri="{28A0092B-C50C-407E-A947-70E740481C1C}">
+                <a14:useLocalDpi xmlns:a14="http://schemas.microsoft.com/office/drawing/2010/main" val="0"/>
+              </a:ext>
+            </a:extLst>
+          </a:blip>
+          <a:stretch>
+            <a:fillRect/>
+          </a:stretch>
+        </p:blipFill>
+        <p:spPr>
+          <a:xfrm>
+            <a:off x="4833258" y="3532300"/>
+            <a:ext cx="6850742" cy="3086185"/>
+          </a:xfrm>
+          <a:prstGeom prst="rect">
+            <a:avLst/>
+          </a:prstGeom>
+          <a:ln>
+            <a:noFill/>
+          </a:ln>
+          <a:effectLst>
+            <a:outerShdw blurRad="292100" dist="139700" dir="2700000" algn="tl" rotWithShape="0">
+              <a:srgbClr val="333333">
+                <a:alpha val="65000"/>
+              </a:srgbClr>
+            </a:outerShdw>
+          </a:effectLst>
+        </p:spPr>
+      </p:pic>
+    </p:spTree>
+    <p:extLst>
+      <p:ext uri="{BB962C8B-B14F-4D97-AF65-F5344CB8AC3E}">
+        <p14:creationId xmlns:p14="http://schemas.microsoft.com/office/powerpoint/2010/main" val="249392143"/>
+      </p:ext>
+    </p:extLst>
+  </p:cSld>
+  <p:clrMapOvr>
+    <a:masterClrMapping/>
+  </p:clrMapOvr>
+</p:sld>
+</file>
+
+<file path=ppt/slides/slide11.xml><?xml version="1.0" encoding="utf-8"?>
+<p:sld xmlns:a="http://schemas.openxmlformats.org/drawingml/2006/main" xmlns:r="http://schemas.openxmlformats.org/officeDocument/2006/relationships" xmlns:p="http://schemas.openxmlformats.org/presentationml/2006/main">
+  <p:cSld>
+    <p:bg>
+      <p:bgPr>
+        <a:solidFill>
+          <a:srgbClr val="DC3545"/>
+        </a:solidFill>
+        <a:effectLst/>
+      </p:bgPr>
+    </p:bg>
+    <p:spTree>
+      <p:nvGrpSpPr>
+        <p:cNvPr id="1" name=""/>
+        <p:cNvGrpSpPr/>
+        <p:nvPr/>
+      </p:nvGrpSpPr>
+      <p:grpSpPr>
+        <a:xfrm>
+          <a:off x="0" y="0"/>
+          <a:ext cx="0" cy="0"/>
+          <a:chOff x="0" y="0"/>
+          <a:chExt cx="0" cy="0"/>
+        </a:xfrm>
+      </p:grpSpPr>
+      <p:pic>
+        <p:nvPicPr>
           <p:cNvPr id="5" name="Imagen 4">
             <a:extLst>
               <a:ext uri="{FF2B5EF4-FFF2-40B4-BE49-F238E27FC236}">
@@ -3554,7 +3730,7 @@
 </p:sld>
 </file>
 
-<file path=ppt/slides/slide11.xml><?xml version="1.0" encoding="utf-8"?>
+<file path=ppt/slides/slide12.xml><?xml version="1.0" encoding="utf-8"?>
 <p:sld xmlns:a="http://schemas.openxmlformats.org/drawingml/2006/main" xmlns:r="http://schemas.openxmlformats.org/officeDocument/2006/relationships" xmlns:p="http://schemas.openxmlformats.org/presentationml/2006/main">
   <p:cSld>
     <p:bg>
@@ -4735,6 +4911,179 @@
     <p:bg>
       <p:bgPr>
         <a:solidFill>
+          <a:srgbClr val="007BFF"/>
+        </a:solidFill>
+        <a:effectLst/>
+      </p:bgPr>
+    </p:bg>
+    <p:spTree>
+      <p:nvGrpSpPr>
+        <p:cNvPr id="1" name=""/>
+        <p:cNvGrpSpPr/>
+        <p:nvPr/>
+      </p:nvGrpSpPr>
+      <p:grpSpPr>
+        <a:xfrm>
+          <a:off x="0" y="0"/>
+          <a:ext cx="0" cy="0"/>
+          <a:chOff x="0" y="0"/>
+          <a:chExt cx="0" cy="0"/>
+        </a:xfrm>
+      </p:grpSpPr>
+      <p:pic>
+        <p:nvPicPr>
+          <p:cNvPr id="3" name="Imagen 2">
+            <a:extLst>
+              <a:ext uri="{FF2B5EF4-FFF2-40B4-BE49-F238E27FC236}">
+                <a16:creationId xmlns:a16="http://schemas.microsoft.com/office/drawing/2014/main" id="{E34C8573-DD5D-402E-960A-BBA52FD155B7}"/>
+              </a:ext>
+            </a:extLst>
+          </p:cNvPr>
+          <p:cNvPicPr>
+            <a:picLocks noChangeAspect="1"/>
+          </p:cNvPicPr>
+          <p:nvPr/>
+        </p:nvPicPr>
+        <p:blipFill>
+          <a:blip r:embed="rId2">
+            <a:extLst>
+              <a:ext uri="{28A0092B-C50C-407E-A947-70E740481C1C}">
+                <a14:useLocalDpi xmlns:a14="http://schemas.microsoft.com/office/drawing/2010/main" val="0"/>
+              </a:ext>
+            </a:extLst>
+          </a:blip>
+          <a:srcRect/>
+          <a:stretch/>
+        </p:blipFill>
+        <p:spPr>
+          <a:xfrm>
+            <a:off x="4770783" y="344556"/>
+            <a:ext cx="6911094" cy="3084443"/>
+          </a:xfrm>
+          <a:prstGeom prst="rect">
+            <a:avLst/>
+          </a:prstGeom>
+          <a:ln>
+            <a:noFill/>
+          </a:ln>
+          <a:effectLst>
+            <a:outerShdw blurRad="292100" dist="139700" dir="2700000" algn="tl" rotWithShape="0">
+              <a:srgbClr val="333333">
+                <a:alpha val="65000"/>
+              </a:srgbClr>
+            </a:outerShdw>
+          </a:effectLst>
+        </p:spPr>
+      </p:pic>
+      <p:pic>
+        <p:nvPicPr>
+          <p:cNvPr id="6" name="Imagen 5">
+            <a:extLst>
+              <a:ext uri="{FF2B5EF4-FFF2-40B4-BE49-F238E27FC236}">
+                <a16:creationId xmlns:a16="http://schemas.microsoft.com/office/drawing/2014/main" id="{0D05216A-28FF-429E-84F2-94A436494E04}"/>
+              </a:ext>
+            </a:extLst>
+          </p:cNvPr>
+          <p:cNvPicPr>
+            <a:picLocks noChangeAspect="1"/>
+          </p:cNvPicPr>
+          <p:nvPr/>
+        </p:nvPicPr>
+        <p:blipFill>
+          <a:blip r:embed="rId3">
+            <a:extLst>
+              <a:ext uri="{28A0092B-C50C-407E-A947-70E740481C1C}">
+                <a14:useLocalDpi xmlns:a14="http://schemas.microsoft.com/office/drawing/2010/main" val="0"/>
+              </a:ext>
+            </a:extLst>
+          </a:blip>
+          <a:srcRect/>
+          <a:stretch/>
+        </p:blipFill>
+        <p:spPr>
+          <a:xfrm>
+            <a:off x="616139" y="344557"/>
+            <a:ext cx="3664312" cy="6228521"/>
+          </a:xfrm>
+          <a:prstGeom prst="rect">
+            <a:avLst/>
+          </a:prstGeom>
+          <a:ln>
+            <a:noFill/>
+          </a:ln>
+          <a:effectLst>
+            <a:outerShdw blurRad="292100" dist="139700" dir="2700000" algn="tl" rotWithShape="0">
+              <a:srgbClr val="333333">
+                <a:alpha val="65000"/>
+              </a:srgbClr>
+            </a:outerShdw>
+          </a:effectLst>
+        </p:spPr>
+      </p:pic>
+      <p:pic>
+        <p:nvPicPr>
+          <p:cNvPr id="11" name="Imagen 10">
+            <a:extLst>
+              <a:ext uri="{FF2B5EF4-FFF2-40B4-BE49-F238E27FC236}">
+                <a16:creationId xmlns:a16="http://schemas.microsoft.com/office/drawing/2014/main" id="{2EFD1A22-0EC3-4AA7-9102-F3AE47C261BA}"/>
+              </a:ext>
+            </a:extLst>
+          </p:cNvPr>
+          <p:cNvPicPr>
+            <a:picLocks noChangeAspect="1"/>
+          </p:cNvPicPr>
+          <p:nvPr/>
+        </p:nvPicPr>
+        <p:blipFill>
+          <a:blip r:embed="rId4">
+            <a:extLst>
+              <a:ext uri="{28A0092B-C50C-407E-A947-70E740481C1C}">
+                <a14:useLocalDpi xmlns:a14="http://schemas.microsoft.com/office/drawing/2010/main" val="0"/>
+              </a:ext>
+            </a:extLst>
+          </a:blip>
+          <a:srcRect/>
+          <a:stretch/>
+        </p:blipFill>
+        <p:spPr>
+          <a:xfrm>
+            <a:off x="4770783" y="3428999"/>
+            <a:ext cx="6911094" cy="3144079"/>
+          </a:xfrm>
+          <a:prstGeom prst="rect">
+            <a:avLst/>
+          </a:prstGeom>
+          <a:ln>
+            <a:noFill/>
+          </a:ln>
+          <a:effectLst>
+            <a:outerShdw blurRad="292100" dist="139700" dir="2700000" algn="tl" rotWithShape="0">
+              <a:srgbClr val="333333">
+                <a:alpha val="65000"/>
+              </a:srgbClr>
+            </a:outerShdw>
+          </a:effectLst>
+        </p:spPr>
+      </p:pic>
+    </p:spTree>
+    <p:extLst>
+      <p:ext uri="{BB962C8B-B14F-4D97-AF65-F5344CB8AC3E}">
+        <p14:creationId xmlns:p14="http://schemas.microsoft.com/office/powerpoint/2010/main" val="9424812"/>
+      </p:ext>
+    </p:extLst>
+  </p:cSld>
+  <p:clrMapOvr>
+    <a:masterClrMapping/>
+  </p:clrMapOvr>
+</p:sld>
+</file>
+
+<file path=ppt/slides/slide9.xml><?xml version="1.0" encoding="utf-8"?>
+<p:sld xmlns:a="http://schemas.openxmlformats.org/drawingml/2006/main" xmlns:r="http://schemas.openxmlformats.org/officeDocument/2006/relationships" xmlns:p="http://schemas.openxmlformats.org/presentationml/2006/main">
+  <p:cSld>
+    <p:bg>
+      <p:bgPr>
+        <a:solidFill>
           <a:srgbClr val="6C757D"/>
         </a:solidFill>
         <a:effectLst/>
@@ -4896,181 +5245,6 @@
     <p:extLst>
       <p:ext uri="{BB962C8B-B14F-4D97-AF65-F5344CB8AC3E}">
         <p14:creationId xmlns:p14="http://schemas.microsoft.com/office/powerpoint/2010/main" val="204444149"/>
-      </p:ext>
-    </p:extLst>
-  </p:cSld>
-  <p:clrMapOvr>
-    <a:masterClrMapping/>
-  </p:clrMapOvr>
-</p:sld>
-</file>
-
-<file path=ppt/slides/slide9.xml><?xml version="1.0" encoding="utf-8"?>
-<p:sld xmlns:a="http://schemas.openxmlformats.org/drawingml/2006/main" xmlns:r="http://schemas.openxmlformats.org/officeDocument/2006/relationships" xmlns:p="http://schemas.openxmlformats.org/presentationml/2006/main">
-  <p:cSld>
-    <p:bg>
-      <p:bgPr>
-        <a:solidFill>
-          <a:srgbClr val="DC3545"/>
-        </a:solidFill>
-        <a:effectLst/>
-      </p:bgPr>
-    </p:bg>
-    <p:spTree>
-      <p:nvGrpSpPr>
-        <p:cNvPr id="1" name=""/>
-        <p:cNvGrpSpPr/>
-        <p:nvPr/>
-      </p:nvGrpSpPr>
-      <p:grpSpPr>
-        <a:xfrm>
-          <a:off x="0" y="0"/>
-          <a:ext cx="0" cy="0"/>
-          <a:chOff x="0" y="0"/>
-          <a:chExt cx="0" cy="0"/>
-        </a:xfrm>
-      </p:grpSpPr>
-      <p:pic>
-        <p:nvPicPr>
-          <p:cNvPr id="4" name="Imagen 3">
-            <a:extLst>
-              <a:ext uri="{FF2B5EF4-FFF2-40B4-BE49-F238E27FC236}">
-                <a16:creationId xmlns:a16="http://schemas.microsoft.com/office/drawing/2014/main" id="{11698E99-C662-4D51-A6F8-52151F295BBB}"/>
-              </a:ext>
-            </a:extLst>
-          </p:cNvPr>
-          <p:cNvPicPr>
-            <a:picLocks noChangeAspect="1"/>
-          </p:cNvPicPr>
-          <p:nvPr/>
-        </p:nvPicPr>
-        <p:blipFill rotWithShape="1">
-          <a:blip r:embed="rId2">
-            <a:extLst>
-              <a:ext uri="{28A0092B-C50C-407E-A947-70E740481C1C}">
-                <a14:useLocalDpi xmlns:a14="http://schemas.microsoft.com/office/drawing/2010/main" val="0"/>
-              </a:ext>
-            </a:extLst>
-          </a:blip>
-          <a:srcRect r="415"/>
-          <a:stretch/>
-        </p:blipFill>
-        <p:spPr>
-          <a:xfrm>
-            <a:off x="720762" y="381967"/>
-            <a:ext cx="3503143" cy="6236518"/>
-          </a:xfrm>
-          <a:prstGeom prst="rect">
-            <a:avLst/>
-          </a:prstGeom>
-          <a:ln>
-            <a:noFill/>
-          </a:ln>
-          <a:effectLst>
-            <a:outerShdw blurRad="292100" dist="139700" dir="2700000" algn="tl" rotWithShape="0">
-              <a:srgbClr val="333333">
-                <a:alpha val="65000"/>
-              </a:srgbClr>
-            </a:outerShdw>
-          </a:effectLst>
-        </p:spPr>
-      </p:pic>
-      <p:pic>
-        <p:nvPicPr>
-          <p:cNvPr id="6" name="Imagen 5">
-            <a:extLst>
-              <a:ext uri="{FF2B5EF4-FFF2-40B4-BE49-F238E27FC236}">
-                <a16:creationId xmlns:a16="http://schemas.microsoft.com/office/drawing/2014/main" id="{2A25571F-D635-4BCE-AB37-A54D6700B210}"/>
-              </a:ext>
-            </a:extLst>
-          </p:cNvPr>
-          <p:cNvPicPr>
-            <a:picLocks noChangeAspect="1"/>
-          </p:cNvPicPr>
-          <p:nvPr/>
-        </p:nvPicPr>
-        <p:blipFill>
-          <a:blip r:embed="rId3">
-            <a:extLst>
-              <a:ext uri="{28A0092B-C50C-407E-A947-70E740481C1C}">
-                <a14:useLocalDpi xmlns:a14="http://schemas.microsoft.com/office/drawing/2010/main" val="0"/>
-              </a:ext>
-            </a:extLst>
-          </a:blip>
-          <a:stretch>
-            <a:fillRect/>
-          </a:stretch>
-        </p:blipFill>
-        <p:spPr>
-          <a:xfrm>
-            <a:off x="4833259" y="381966"/>
-            <a:ext cx="6850742" cy="3150333"/>
-          </a:xfrm>
-          <a:prstGeom prst="rect">
-            <a:avLst/>
-          </a:prstGeom>
-          <a:ln>
-            <a:noFill/>
-          </a:ln>
-          <a:effectLst>
-            <a:outerShdw blurRad="292100" dist="139700" dir="2700000" algn="tl" rotWithShape="0">
-              <a:srgbClr val="333333">
-                <a:alpha val="65000"/>
-              </a:srgbClr>
-            </a:outerShdw>
-          </a:effectLst>
-        </p:spPr>
-      </p:pic>
-      <p:pic>
-        <p:nvPicPr>
-          <p:cNvPr id="8" name="Imagen 7">
-            <a:extLst>
-              <a:ext uri="{FF2B5EF4-FFF2-40B4-BE49-F238E27FC236}">
-                <a16:creationId xmlns:a16="http://schemas.microsoft.com/office/drawing/2014/main" id="{5E4143A9-94D8-46E5-9D66-1E5A9223217A}"/>
-              </a:ext>
-            </a:extLst>
-          </p:cNvPr>
-          <p:cNvPicPr>
-            <a:picLocks noChangeAspect="1"/>
-          </p:cNvPicPr>
-          <p:nvPr/>
-        </p:nvPicPr>
-        <p:blipFill>
-          <a:blip r:embed="rId4">
-            <a:extLst>
-              <a:ext uri="{28A0092B-C50C-407E-A947-70E740481C1C}">
-                <a14:useLocalDpi xmlns:a14="http://schemas.microsoft.com/office/drawing/2010/main" val="0"/>
-              </a:ext>
-            </a:extLst>
-          </a:blip>
-          <a:stretch>
-            <a:fillRect/>
-          </a:stretch>
-        </p:blipFill>
-        <p:spPr>
-          <a:xfrm>
-            <a:off x="4833258" y="3532300"/>
-            <a:ext cx="6850742" cy="3086185"/>
-          </a:xfrm>
-          <a:prstGeom prst="rect">
-            <a:avLst/>
-          </a:prstGeom>
-          <a:ln>
-            <a:noFill/>
-          </a:ln>
-          <a:effectLst>
-            <a:outerShdw blurRad="292100" dist="139700" dir="2700000" algn="tl" rotWithShape="0">
-              <a:srgbClr val="333333">
-                <a:alpha val="65000"/>
-              </a:srgbClr>
-            </a:outerShdw>
-          </a:effectLst>
-        </p:spPr>
-      </p:pic>
-    </p:spTree>
-    <p:extLst>
-      <p:ext uri="{BB962C8B-B14F-4D97-AF65-F5344CB8AC3E}">
-        <p14:creationId xmlns:p14="http://schemas.microsoft.com/office/powerpoint/2010/main" val="249392143"/>
       </p:ext>
     </p:extLst>
   </p:cSld>

</xml_diff>